<commit_message>
correction conseil prof + redaction pbjectif
</commit_message>
<xml_diff>
--- a/Fiche_Projet_TE625PS.pptx
+++ b/Fiche_Projet_TE625PS.pptx
@@ -265,7 +265,7 @@
           <a:p>
             <a:fld id="{C3B7BECA-F21C-8F41-BA30-36B2786F78D6}" type="datetimeFigureOut">
               <a:rPr lang="fr-FR" smtClean="0"/>
-              <a:t>12/02/2024</a:t>
+              <a:t>03/03/2024</a:t>
             </a:fld>
             <a:endParaRPr lang="fr-FR"/>
           </a:p>
@@ -465,7 +465,7 @@
           <a:p>
             <a:fld id="{C3B7BECA-F21C-8F41-BA30-36B2786F78D6}" type="datetimeFigureOut">
               <a:rPr lang="fr-FR" smtClean="0"/>
-              <a:t>12/02/2024</a:t>
+              <a:t>03/03/2024</a:t>
             </a:fld>
             <a:endParaRPr lang="fr-FR"/>
           </a:p>
@@ -675,7 +675,7 @@
           <a:p>
             <a:fld id="{C3B7BECA-F21C-8F41-BA30-36B2786F78D6}" type="datetimeFigureOut">
               <a:rPr lang="fr-FR" smtClean="0"/>
-              <a:t>12/02/2024</a:t>
+              <a:t>03/03/2024</a:t>
             </a:fld>
             <a:endParaRPr lang="fr-FR"/>
           </a:p>
@@ -875,7 +875,7 @@
           <a:p>
             <a:fld id="{C3B7BECA-F21C-8F41-BA30-36B2786F78D6}" type="datetimeFigureOut">
               <a:rPr lang="fr-FR" smtClean="0"/>
-              <a:t>12/02/2024</a:t>
+              <a:t>03/03/2024</a:t>
             </a:fld>
             <a:endParaRPr lang="fr-FR"/>
           </a:p>
@@ -1151,7 +1151,7 @@
           <a:p>
             <a:fld id="{C3B7BECA-F21C-8F41-BA30-36B2786F78D6}" type="datetimeFigureOut">
               <a:rPr lang="fr-FR" smtClean="0"/>
-              <a:t>12/02/2024</a:t>
+              <a:t>03/03/2024</a:t>
             </a:fld>
             <a:endParaRPr lang="fr-FR"/>
           </a:p>
@@ -1419,7 +1419,7 @@
           <a:p>
             <a:fld id="{C3B7BECA-F21C-8F41-BA30-36B2786F78D6}" type="datetimeFigureOut">
               <a:rPr lang="fr-FR" smtClean="0"/>
-              <a:t>12/02/2024</a:t>
+              <a:t>03/03/2024</a:t>
             </a:fld>
             <a:endParaRPr lang="fr-FR"/>
           </a:p>
@@ -1834,7 +1834,7 @@
           <a:p>
             <a:fld id="{C3B7BECA-F21C-8F41-BA30-36B2786F78D6}" type="datetimeFigureOut">
               <a:rPr lang="fr-FR" smtClean="0"/>
-              <a:t>12/02/2024</a:t>
+              <a:t>03/03/2024</a:t>
             </a:fld>
             <a:endParaRPr lang="fr-FR"/>
           </a:p>
@@ -1976,7 +1976,7 @@
           <a:p>
             <a:fld id="{C3B7BECA-F21C-8F41-BA30-36B2786F78D6}" type="datetimeFigureOut">
               <a:rPr lang="fr-FR" smtClean="0"/>
-              <a:t>12/02/2024</a:t>
+              <a:t>03/03/2024</a:t>
             </a:fld>
             <a:endParaRPr lang="fr-FR"/>
           </a:p>
@@ -2089,7 +2089,7 @@
           <a:p>
             <a:fld id="{C3B7BECA-F21C-8F41-BA30-36B2786F78D6}" type="datetimeFigureOut">
               <a:rPr lang="fr-FR" smtClean="0"/>
-              <a:t>12/02/2024</a:t>
+              <a:t>03/03/2024</a:t>
             </a:fld>
             <a:endParaRPr lang="fr-FR"/>
           </a:p>
@@ -2402,7 +2402,7 @@
           <a:p>
             <a:fld id="{C3B7BECA-F21C-8F41-BA30-36B2786F78D6}" type="datetimeFigureOut">
               <a:rPr lang="fr-FR" smtClean="0"/>
-              <a:t>12/02/2024</a:t>
+              <a:t>03/03/2024</a:t>
             </a:fld>
             <a:endParaRPr lang="fr-FR"/>
           </a:p>
@@ -2691,7 +2691,7 @@
           <a:p>
             <a:fld id="{C3B7BECA-F21C-8F41-BA30-36B2786F78D6}" type="datetimeFigureOut">
               <a:rPr lang="fr-FR" smtClean="0"/>
-              <a:t>12/02/2024</a:t>
+              <a:t>03/03/2024</a:t>
             </a:fld>
             <a:endParaRPr lang="fr-FR"/>
           </a:p>
@@ -2934,7 +2934,7 @@
           <a:p>
             <a:fld id="{C3B7BECA-F21C-8F41-BA30-36B2786F78D6}" type="datetimeFigureOut">
               <a:rPr lang="fr-FR" smtClean="0"/>
-              <a:t>12/02/2024</a:t>
+              <a:t>03/03/2024</a:t>
             </a:fld>
             <a:endParaRPr lang="fr-FR"/>
           </a:p>
@@ -3407,8 +3407,13 @@
           <a:p>
             <a:r>
               <a:rPr lang="fr-FR" dirty="0"/>
-              <a:t>Titre : Etude de l’introduction à un nouveau concept mathématique</a:t>
-            </a:r>
+              <a:t>Titre : L’apprentissage par découverte de l’algorithme de </a:t>
+            </a:r>
+            <a:r>
+              <a:rPr lang="fr-FR" dirty="0" err="1"/>
+              <a:t>dijkstra</a:t>
+            </a:r>
+            <a:endParaRPr lang="fr-FR" dirty="0"/>
           </a:p>
           <a:p>
             <a:r>
@@ -3417,7 +3422,7 @@
             </a:r>
             <a:r>
               <a:rPr lang="fr-FR" dirty="0" err="1"/>
-              <a:t>InNoCoM</a:t>
+              <a:t>INCoM</a:t>
             </a:r>
             <a:endParaRPr lang="fr-FR" dirty="0"/>
           </a:p>
@@ -3570,25 +3575,79 @@
         <p:spPr/>
         <p:txBody>
           <a:bodyPr>
-            <a:normAutofit fontScale="85000" lnSpcReduction="20000"/>
+            <a:normAutofit fontScale="47500" lnSpcReduction="20000"/>
           </a:bodyPr>
           <a:lstStyle/>
           <a:p>
             <a:r>
               <a:rPr lang="fr-FR" dirty="0"/>
-              <a:t>De nombreuses personnes rencontrent des obstacles dans la compréhension des concepts mathématiques, même après avoir suivi une formation scientifique ou mathématique approfondie. Fréquemment, elles se sentent désorientées lorsqu'elles abordent les mathématiques. La question qui se pose est la suivante : est-il plus judicieux d'enseigner ces concepts à travers un cours traditionnel, accompagné de la présentation des outils de résolution de problèmes, ou bien de permettre aux élèves d'utiliser directement ces outils sans passer par un cours préalable ? </a:t>
-            </a:r>
-          </a:p>
-          <a:p>
+              <a:t>De nombreuses personnes rencontrent des obstacles dans la compréhension des concepts mathématiques, selon</a:t>
+            </a:r>
+            <a:r>
+              <a:rPr lang="en-US" dirty="0"/>
+              <a:t> </a:t>
+            </a:r>
+            <a:r>
+              <a:rPr lang="en-US" dirty="0" err="1"/>
+              <a:t>Eléa</a:t>
+            </a:r>
+            <a:r>
+              <a:rPr lang="en-US" dirty="0"/>
+              <a:t> </a:t>
+            </a:r>
+            <a:r>
+              <a:rPr lang="en-US" dirty="0" err="1"/>
+              <a:t>Pommiers</a:t>
+            </a:r>
+            <a:r>
+              <a:rPr lang="en-US" dirty="0"/>
+              <a:t> (2023). French secondary school students' results drop post-pandemic, as elsewhere</a:t>
+            </a:r>
             <a:r>
               <a:rPr lang="fr-FR" dirty="0"/>
-              <a:t>Les élèves auront pour mission de comprendre la nature d'un graphe et la manière de construire le chemin avec le score le plus bas. Un groupe recevra l'enseignement de l'algorithme de Dijkstra au moyen d'un cours explicatif, tandis que l'autre groupe acquerra cette connaissance par le biais d'une phase d'apprentissage pratique avec l'outil. </a:t>
-            </a:r>
-            <a:r>
-              <a:rPr lang="fr-FR"/>
-              <a:t>L'objectif est de mesurer l'impact de l'apprentissage moteur sur la performance du premier groupe par rapport au second, afin de déterminer l'efficacité des deux approches.</a:t>
-            </a:r>
+              <a:t>. Fréquemment, elles se sentent désorientées lorsqu'elles abordent les mathématiques. La question qui se pose est la suivante : est-il plus judicieux d'enseigner ces concepts à travers un cours traditionnel, accompagné de la présentation des outils de résolution de problèmes, ou bien de permettre aux élèves d'utiliser directement ces outils sans passer par un cours préalable ? </a:t>
+            </a:r>
+          </a:p>
+          <a:p>
+            <a:r>
+              <a:rPr lang="fr-FR" dirty="0"/>
+              <a:t>Les élèves auront pour mission de comprendre la nature d'un graphe et la manière de construire le chemin avec le score le plus bas. Un groupe recevra l'enseignement de l'algorithme de Dijkstra au moyen d'un cours explicatif, tandis que l'autre groupe acquerra cette connaissance par le biais d'une phase d'apprentissage pratique avec l'outil. L'objectif est de mesurer l'impact de l'apprentissage moteur sur la performance du premier groupe par rapport au second, afin de déterminer l'efficacité des deux approches.</a:t>
+            </a:r>
+          </a:p>
+          <a:p>
             <a:endParaRPr lang="fr-FR" dirty="0"/>
+          </a:p>
+          <a:p>
+            <a:r>
+              <a:rPr lang="fr-FR" dirty="0"/>
+              <a:t>L'approche d'apprentissage par la découverte pourrait être plus efficace pour des concepts mathématiques impliquant des instructions répétitives, comme l'algorithme de Dijkstra en théorie des graphes. Selon ma propre expérience, la compréhension de ce type d'algorithme est limitée lorsqu'il est présenté de manière brutale sans donner aux apprenants l'occasion de s'engager activement dans le processus d'apprentissage.</a:t>
+            </a:r>
+          </a:p>
+          <a:p>
+            <a:endParaRPr lang="fr-FR" dirty="0"/>
+          </a:p>
+          <a:p>
+            <a:r>
+              <a:rPr lang="fr-FR" dirty="0"/>
+              <a:t>L'algorithme de Dijkstra est une méthode qui permet de déterminer le chemin le plus court entre deux points dans un réseau connecté par des arêtes pondérées positivement. Bien que cette idée soit relativement simple, elle constitue un domaine qui n'a pas encore été abordé auprès du groupe de personnes qui participeront à l'expérience.</a:t>
+            </a:r>
+          </a:p>
+          <a:p>
+            <a:endParaRPr lang="fr-FR" dirty="0"/>
+          </a:p>
+          <a:p>
+            <a:r>
+              <a:rPr lang="fr-FR" dirty="0"/>
+              <a:t>L'algorithme de Dijkstra est une méthode utilisée pour trouver le chemin le plus court entre deux points en utilisant une approche itérative. Cette notion peut être précieuse pour résoudre des problèmes rencontrés par les data </a:t>
+            </a:r>
+            <a:r>
+              <a:rPr lang="fr-FR" dirty="0" err="1"/>
+              <a:t>scientists</a:t>
+            </a:r>
+            <a:r>
+              <a:rPr lang="fr-FR" dirty="0"/>
+              <a:t>.</a:t>
+            </a:r>
           </a:p>
         </p:txBody>
       </p:sp>
@@ -3671,6 +3730,103 @@
           <a:bodyPr/>
           <a:lstStyle/>
           <a:p>
+            <a:r>
+              <a:rPr lang="fr-FR" dirty="0"/>
+              <a:t>Apprentissage par découverte (Bruner, 1961)</a:t>
+            </a:r>
+          </a:p>
+          <a:p>
+            <a:pPr algn="just"/>
+            <a:r>
+              <a:rPr lang="fr-FR" dirty="0"/>
+              <a:t>Apprentissage par découverte application aux concepts mathématiques  - Muhammad, I., </a:t>
+            </a:r>
+            <a:r>
+              <a:rPr lang="fr-FR" dirty="0" err="1"/>
+              <a:t>Darmayanti</a:t>
+            </a:r>
+            <a:r>
+              <a:rPr lang="fr-FR" dirty="0"/>
+              <a:t>, R., Arif, V. R., &amp; </a:t>
+            </a:r>
+            <a:r>
+              <a:rPr lang="fr-FR" dirty="0" err="1"/>
+              <a:t>Afolaranmi</a:t>
+            </a:r>
+            <a:r>
+              <a:rPr lang="fr-FR" dirty="0"/>
+              <a:t>, A. O. (2023). Discovery Learning </a:t>
+            </a:r>
+            <a:r>
+              <a:rPr lang="fr-FR" dirty="0" err="1"/>
+              <a:t>Research</a:t>
+            </a:r>
+            <a:r>
+              <a:rPr lang="fr-FR" dirty="0"/>
+              <a:t> in </a:t>
+            </a:r>
+            <a:r>
+              <a:rPr lang="fr-FR" dirty="0" err="1"/>
+              <a:t>Mathematics</a:t>
+            </a:r>
+            <a:r>
+              <a:rPr lang="fr-FR" dirty="0"/>
+              <a:t> Learning: A </a:t>
+            </a:r>
+            <a:r>
+              <a:rPr lang="fr-FR" dirty="0" err="1"/>
+              <a:t>Bibliometric</a:t>
+            </a:r>
+            <a:r>
+              <a:rPr lang="fr-FR" dirty="0"/>
+              <a:t> </a:t>
+            </a:r>
+            <a:r>
+              <a:rPr lang="fr-FR" dirty="0" err="1"/>
+              <a:t>Review</a:t>
+            </a:r>
+            <a:r>
+              <a:rPr lang="fr-FR" dirty="0"/>
+              <a:t>. </a:t>
+            </a:r>
+            <a:r>
+              <a:rPr lang="fr-FR" i="1" dirty="0"/>
+              <a:t>Delta-Phi: </a:t>
+            </a:r>
+            <a:r>
+              <a:rPr lang="fr-FR" i="1" dirty="0" err="1"/>
+              <a:t>Jurnal</a:t>
+            </a:r>
+            <a:r>
+              <a:rPr lang="fr-FR" i="1" dirty="0"/>
+              <a:t> </a:t>
+            </a:r>
+            <a:r>
+              <a:rPr lang="fr-FR" i="1" dirty="0" err="1"/>
+              <a:t>Pendidikan</a:t>
+            </a:r>
+            <a:r>
+              <a:rPr lang="fr-FR" i="1" dirty="0"/>
+              <a:t> </a:t>
+            </a:r>
+            <a:r>
+              <a:rPr lang="fr-FR" i="1" dirty="0" err="1"/>
+              <a:t>Matematika</a:t>
+            </a:r>
+            <a:r>
+              <a:rPr lang="fr-FR" dirty="0"/>
+              <a:t>, </a:t>
+            </a:r>
+            <a:r>
+              <a:rPr lang="fr-FR" i="1" dirty="0"/>
+              <a:t>1</a:t>
+            </a:r>
+            <a:r>
+              <a:rPr lang="fr-FR" dirty="0"/>
+              <a:t>(1), 26-33.</a:t>
+            </a:r>
+          </a:p>
+          <a:p>
             <a:endParaRPr lang="fr-FR" dirty="0"/>
           </a:p>
         </p:txBody>
@@ -3754,7 +3910,10 @@
           <a:bodyPr/>
           <a:lstStyle/>
           <a:p>
-            <a:endParaRPr lang="fr-FR"/>
+            <a:r>
+              <a:rPr lang="fr-FR" dirty="0"/>
+              <a:t>Mon but est de comparer le temps d'exécution afin de déterminer la réussite dans la recherche du chemin le plus court entre le groupe de personnes qui a appris à exécuter l'algorithme simplement en l'observant et le groupe qui a tenté de le mettre en pratique.</a:t>
+            </a:r>
           </a:p>
         </p:txBody>
       </p:sp>
@@ -3836,6 +3995,120 @@
         <p:txBody>
           <a:bodyPr/>
           <a:lstStyle/>
+          <a:p>
+            <a:pPr marL="0" indent="0">
+              <a:buNone/>
+            </a:pPr>
+            <a:r>
+              <a:rPr lang="fr-FR" dirty="0"/>
+              <a:t>Situation d’apprentissage (Navigation et choix itinéraire, Sari, I. P., </a:t>
+            </a:r>
+            <a:r>
+              <a:rPr lang="fr-FR" dirty="0" err="1"/>
+              <a:t>Fahroza</a:t>
+            </a:r>
+            <a:r>
+              <a:rPr lang="fr-FR" dirty="0"/>
+              <a:t>, M. F., </a:t>
+            </a:r>
+            <a:r>
+              <a:rPr lang="fr-FR" dirty="0" err="1"/>
+              <a:t>Mufit</a:t>
+            </a:r>
+            <a:r>
+              <a:rPr lang="fr-FR" dirty="0"/>
+              <a:t>, M. I., &amp; </a:t>
+            </a:r>
+            <a:r>
+              <a:rPr lang="fr-FR" dirty="0" err="1"/>
+              <a:t>Qathrunad</a:t>
+            </a:r>
+            <a:r>
+              <a:rPr lang="fr-FR" dirty="0"/>
+              <a:t>, I. F. (2021). </a:t>
+            </a:r>
+            <a:r>
+              <a:rPr lang="fr-FR" dirty="0" err="1"/>
+              <a:t>Implementation</a:t>
+            </a:r>
+            <a:r>
+              <a:rPr lang="fr-FR" dirty="0"/>
+              <a:t> of </a:t>
+            </a:r>
+            <a:r>
+              <a:rPr lang="fr-FR" dirty="0" err="1"/>
+              <a:t>Dijkstra's</a:t>
+            </a:r>
+            <a:r>
+              <a:rPr lang="fr-FR" dirty="0"/>
+              <a:t> </a:t>
+            </a:r>
+            <a:r>
+              <a:rPr lang="fr-FR" dirty="0" err="1"/>
+              <a:t>Algorithm</a:t>
+            </a:r>
+            <a:r>
+              <a:rPr lang="fr-FR" dirty="0"/>
+              <a:t> to </a:t>
+            </a:r>
+            <a:r>
+              <a:rPr lang="fr-FR" dirty="0" err="1"/>
+              <a:t>Determine</a:t>
+            </a:r>
+            <a:r>
+              <a:rPr lang="fr-FR" dirty="0"/>
+              <a:t> the </a:t>
+            </a:r>
+            <a:r>
+              <a:rPr lang="fr-FR" dirty="0" err="1"/>
+              <a:t>Shortest</a:t>
+            </a:r>
+            <a:r>
+              <a:rPr lang="fr-FR" dirty="0"/>
+              <a:t> Route in a City. </a:t>
+            </a:r>
+            <a:r>
+              <a:rPr lang="fr-FR" i="1" dirty="0"/>
+              <a:t>Journal of Computer Science, Information </a:t>
+            </a:r>
+            <a:r>
+              <a:rPr lang="fr-FR" i="1" dirty="0" err="1"/>
+              <a:t>Technology</a:t>
+            </a:r>
+            <a:r>
+              <a:rPr lang="fr-FR" i="1" dirty="0"/>
+              <a:t> and </a:t>
+            </a:r>
+            <a:r>
+              <a:rPr lang="fr-FR" i="1" dirty="0" err="1"/>
+              <a:t>Telecommunication</a:t>
+            </a:r>
+            <a:r>
+              <a:rPr lang="fr-FR" i="1" dirty="0"/>
+              <a:t> Engineering</a:t>
+            </a:r>
+            <a:r>
+              <a:rPr lang="fr-FR" dirty="0"/>
+              <a:t>, </a:t>
+            </a:r>
+            <a:r>
+              <a:rPr lang="fr-FR" i="1" dirty="0"/>
+              <a:t>2</a:t>
+            </a:r>
+            <a:r>
+              <a:rPr lang="fr-FR" dirty="0"/>
+              <a:t>(1), 134-138.)</a:t>
+            </a:r>
+          </a:p>
+          <a:p>
+            <a:pPr marL="0" indent="0">
+              <a:buNone/>
+            </a:pPr>
+            <a:r>
+              <a:rPr lang="fr-FR" dirty="0"/>
+              <a:t>Mesure du comportement  </a:t>
+            </a:r>
+          </a:p>
           <a:p>
             <a:pPr marL="0" indent="0">
               <a:buNone/>

</xml_diff>

<commit_message>
il manque la procedure
</commit_message>
<xml_diff>
--- a/Fiche_Projet_TE625PS.pptx
+++ b/Fiche_Projet_TE625PS.pptx
@@ -9,7 +9,8 @@
     <p:sldId id="261" r:id="rId3"/>
     <p:sldId id="262" r:id="rId4"/>
     <p:sldId id="263" r:id="rId5"/>
-    <p:sldId id="264" r:id="rId6"/>
+    <p:sldId id="265" r:id="rId6"/>
+    <p:sldId id="264" r:id="rId7"/>
   </p:sldIdLst>
   <p:sldSz cx="12192000" cy="6858000"/>
   <p:notesSz cx="6858000" cy="9144000"/>
@@ -265,7 +266,7 @@
           <a:p>
             <a:fld id="{C3B7BECA-F21C-8F41-BA30-36B2786F78D6}" type="datetimeFigureOut">
               <a:rPr lang="fr-FR" smtClean="0"/>
-              <a:t>03/03/2024</a:t>
+              <a:t>11/03/2024</a:t>
             </a:fld>
             <a:endParaRPr lang="fr-FR"/>
           </a:p>
@@ -465,7 +466,7 @@
           <a:p>
             <a:fld id="{C3B7BECA-F21C-8F41-BA30-36B2786F78D6}" type="datetimeFigureOut">
               <a:rPr lang="fr-FR" smtClean="0"/>
-              <a:t>03/03/2024</a:t>
+              <a:t>11/03/2024</a:t>
             </a:fld>
             <a:endParaRPr lang="fr-FR"/>
           </a:p>
@@ -675,7 +676,7 @@
           <a:p>
             <a:fld id="{C3B7BECA-F21C-8F41-BA30-36B2786F78D6}" type="datetimeFigureOut">
               <a:rPr lang="fr-FR" smtClean="0"/>
-              <a:t>03/03/2024</a:t>
+              <a:t>11/03/2024</a:t>
             </a:fld>
             <a:endParaRPr lang="fr-FR"/>
           </a:p>
@@ -875,7 +876,7 @@
           <a:p>
             <a:fld id="{C3B7BECA-F21C-8F41-BA30-36B2786F78D6}" type="datetimeFigureOut">
               <a:rPr lang="fr-FR" smtClean="0"/>
-              <a:t>03/03/2024</a:t>
+              <a:t>11/03/2024</a:t>
             </a:fld>
             <a:endParaRPr lang="fr-FR"/>
           </a:p>
@@ -1151,7 +1152,7 @@
           <a:p>
             <a:fld id="{C3B7BECA-F21C-8F41-BA30-36B2786F78D6}" type="datetimeFigureOut">
               <a:rPr lang="fr-FR" smtClean="0"/>
-              <a:t>03/03/2024</a:t>
+              <a:t>11/03/2024</a:t>
             </a:fld>
             <a:endParaRPr lang="fr-FR"/>
           </a:p>
@@ -1419,7 +1420,7 @@
           <a:p>
             <a:fld id="{C3B7BECA-F21C-8F41-BA30-36B2786F78D6}" type="datetimeFigureOut">
               <a:rPr lang="fr-FR" smtClean="0"/>
-              <a:t>03/03/2024</a:t>
+              <a:t>11/03/2024</a:t>
             </a:fld>
             <a:endParaRPr lang="fr-FR"/>
           </a:p>
@@ -1834,7 +1835,7 @@
           <a:p>
             <a:fld id="{C3B7BECA-F21C-8F41-BA30-36B2786F78D6}" type="datetimeFigureOut">
               <a:rPr lang="fr-FR" smtClean="0"/>
-              <a:t>03/03/2024</a:t>
+              <a:t>11/03/2024</a:t>
             </a:fld>
             <a:endParaRPr lang="fr-FR"/>
           </a:p>
@@ -1976,7 +1977,7 @@
           <a:p>
             <a:fld id="{C3B7BECA-F21C-8F41-BA30-36B2786F78D6}" type="datetimeFigureOut">
               <a:rPr lang="fr-FR" smtClean="0"/>
-              <a:t>03/03/2024</a:t>
+              <a:t>11/03/2024</a:t>
             </a:fld>
             <a:endParaRPr lang="fr-FR"/>
           </a:p>
@@ -2089,7 +2090,7 @@
           <a:p>
             <a:fld id="{C3B7BECA-F21C-8F41-BA30-36B2786F78D6}" type="datetimeFigureOut">
               <a:rPr lang="fr-FR" smtClean="0"/>
-              <a:t>03/03/2024</a:t>
+              <a:t>11/03/2024</a:t>
             </a:fld>
             <a:endParaRPr lang="fr-FR"/>
           </a:p>
@@ -2402,7 +2403,7 @@
           <a:p>
             <a:fld id="{C3B7BECA-F21C-8F41-BA30-36B2786F78D6}" type="datetimeFigureOut">
               <a:rPr lang="fr-FR" smtClean="0"/>
-              <a:t>03/03/2024</a:t>
+              <a:t>11/03/2024</a:t>
             </a:fld>
             <a:endParaRPr lang="fr-FR"/>
           </a:p>
@@ -2691,7 +2692,7 @@
           <a:p>
             <a:fld id="{C3B7BECA-F21C-8F41-BA30-36B2786F78D6}" type="datetimeFigureOut">
               <a:rPr lang="fr-FR" smtClean="0"/>
-              <a:t>03/03/2024</a:t>
+              <a:t>11/03/2024</a:t>
             </a:fld>
             <a:endParaRPr lang="fr-FR"/>
           </a:p>
@@ -2934,7 +2935,7 @@
           <a:p>
             <a:fld id="{C3B7BECA-F21C-8F41-BA30-36B2786F78D6}" type="datetimeFigureOut">
               <a:rPr lang="fr-FR" smtClean="0"/>
-              <a:t>03/03/2024</a:t>
+              <a:t>11/03/2024</a:t>
             </a:fld>
             <a:endParaRPr lang="fr-FR"/>
           </a:p>
@@ -3407,7 +3408,7 @@
           <a:p>
             <a:r>
               <a:rPr lang="fr-FR" dirty="0"/>
-              <a:t>Titre : L’apprentissage par découverte de l’algorithme de </a:t>
+              <a:t>Titre : étude de l’apprentissage par réalisation motrice de l’algorithme de </a:t>
             </a:r>
             <a:r>
               <a:rPr lang="fr-FR" dirty="0" err="1"/>
@@ -3418,13 +3419,8 @@
           <a:p>
             <a:r>
               <a:rPr lang="fr-FR" dirty="0"/>
-              <a:t>Acronyme : </a:t>
-            </a:r>
-            <a:r>
-              <a:rPr lang="fr-FR" dirty="0" err="1"/>
-              <a:t>INCoM</a:t>
-            </a:r>
-            <a:endParaRPr lang="fr-FR" dirty="0"/>
+              <a:t>Acronyme : EARMAD</a:t>
+            </a:r>
           </a:p>
         </p:txBody>
       </p:sp>
@@ -3620,7 +3616,7 @@
           <a:p>
             <a:r>
               <a:rPr lang="fr-FR" dirty="0"/>
-              <a:t>L'approche d'apprentissage par la découverte pourrait être plus efficace pour des concepts mathématiques impliquant des instructions répétitives, comme l'algorithme de Dijkstra en théorie des graphes. Selon ma propre expérience, la compréhension de ce type d'algorithme est limitée lorsqu'il est présenté de manière brutale sans donner aux apprenants l'occasion de s'engager activement dans le processus d'apprentissage.</a:t>
+              <a:t>L'approche d'apprentissage par la réalisation motrice pourrait être plus efficace pour des concepts mathématiques impliquant des instructions répétitives, comme l'algorithme de Dijkstra en théorie des graphes. Selon ma propre expérience, la compréhension de ce type d'algorithme est limitée lorsqu'il est présenté de manière brutale sans donner aux apprenants l'occasion de s'engager activement dans le processus d'apprentissage.</a:t>
             </a:r>
           </a:p>
           <a:p>
@@ -3907,12 +3903,26 @@
         </p:nvSpPr>
         <p:spPr/>
         <p:txBody>
-          <a:bodyPr/>
+          <a:bodyPr>
+            <a:normAutofit fontScale="85000" lnSpcReduction="20000"/>
+          </a:bodyPr>
           <a:lstStyle/>
           <a:p>
             <a:r>
               <a:rPr lang="fr-FR" dirty="0"/>
-              <a:t>Mon but est de comparer le temps d'exécution afin de déterminer la réussite dans la recherche du chemin le plus court entre le groupe de personnes qui a appris à exécuter l'algorithme simplement en l'observant et le groupe qui a tenté de le mettre en pratique.</a:t>
+              <a:t>Nous souhaitons établir un lien entre la performance dans la résolution d'un problème de plus court chemin et la méthode d'apprentissage. L'objectif de cette expérience est de démontrer l'efficacité de l'apprentissage par réalisation motrice en tant que moyen d'enseigner et d'apprendre une notion mathématique.</a:t>
+            </a:r>
+          </a:p>
+          <a:p>
+            <a:r>
+              <a:rPr lang="fr-FR" dirty="0"/>
+              <a:t>Ici, nous formerons deux groupes d'individus sans aucune connaissance préalable sur le sujet. Le groupe A aura pour mission d'apprendre l'algorithme tout en le résolvant à l'aide d'une feuille de brouillon, tandis que le groupe B disposera uniquement de l'algorithme de Dijkstra sous forme de pseudocode pendant la réalisation de l'expérience.</a:t>
+            </a:r>
+          </a:p>
+          <a:p>
+            <a:r>
+              <a:rPr lang="fr-FR" dirty="0"/>
+              <a:t>Le groupe A sera celui qui adoptera l'approche de l'apprentissage par réalisation motrice, tandis que le groupe B optera pour un simple écran expliquant la méthode. Les temps de résolution et les taux de réussite de chaque groupe constitueront les critères sur lesquels nous nous baserons pour évaluer le succès ou l'échec de l'expérience.</a:t>
             </a:r>
           </a:p>
         </p:txBody>
@@ -3931,6 +3941,96 @@
 </file>
 
 <file path=ppt/slides/slide5.xml><?xml version="1.0" encoding="utf-8"?>
+<p:sld xmlns:a="http://schemas.openxmlformats.org/drawingml/2006/main" xmlns:r="http://schemas.openxmlformats.org/officeDocument/2006/relationships" xmlns:p="http://schemas.openxmlformats.org/presentationml/2006/main">
+  <p:cSld>
+    <p:spTree>
+      <p:nvGrpSpPr>
+        <p:cNvPr id="1" name=""/>
+        <p:cNvGrpSpPr/>
+        <p:nvPr/>
+      </p:nvGrpSpPr>
+      <p:grpSpPr>
+        <a:xfrm>
+          <a:off x="0" y="0"/>
+          <a:ext cx="0" cy="0"/>
+          <a:chOff x="0" y="0"/>
+          <a:chExt cx="0" cy="0"/>
+        </a:xfrm>
+      </p:grpSpPr>
+      <p:sp>
+        <p:nvSpPr>
+          <p:cNvPr id="2" name="Titre 1">
+            <a:extLst>
+              <a:ext uri="{FF2B5EF4-FFF2-40B4-BE49-F238E27FC236}">
+                <a16:creationId xmlns:a16="http://schemas.microsoft.com/office/drawing/2014/main" id="{DA1A4F56-7416-7DA7-955B-C83B904524D8}"/>
+              </a:ext>
+            </a:extLst>
+          </p:cNvPr>
+          <p:cNvSpPr>
+            <a:spLocks noGrp="1"/>
+          </p:cNvSpPr>
+          <p:nvPr>
+            <p:ph type="title"/>
+          </p:nvPr>
+        </p:nvSpPr>
+        <p:spPr/>
+        <p:txBody>
+          <a:bodyPr/>
+          <a:lstStyle/>
+          <a:p>
+            <a:r>
+              <a:rPr lang="fr-FR" dirty="0" err="1"/>
+              <a:t>Procedure</a:t>
+            </a:r>
+            <a:r>
+              <a:rPr lang="fr-FR" dirty="0"/>
+              <a:t>:</a:t>
+            </a:r>
+          </a:p>
+        </p:txBody>
+      </p:sp>
+      <p:sp>
+        <p:nvSpPr>
+          <p:cNvPr id="3" name="Espace réservé du contenu 2">
+            <a:extLst>
+              <a:ext uri="{FF2B5EF4-FFF2-40B4-BE49-F238E27FC236}">
+                <a16:creationId xmlns:a16="http://schemas.microsoft.com/office/drawing/2014/main" id="{A2BDFEBB-F361-0F38-4D58-091E720EAACC}"/>
+              </a:ext>
+            </a:extLst>
+          </p:cNvPr>
+          <p:cNvSpPr>
+            <a:spLocks noGrp="1"/>
+          </p:cNvSpPr>
+          <p:nvPr>
+            <p:ph idx="1"/>
+          </p:nvPr>
+        </p:nvSpPr>
+        <p:spPr/>
+        <p:txBody>
+          <a:bodyPr/>
+          <a:lstStyle/>
+          <a:p>
+            <a:r>
+              <a:rPr lang="fr-FR" dirty="0"/>
+              <a:t>Bien sûr ! Alors, imagine que sur une feuille de papier avec des points et des lignes, on peut regarder les choses sous différents angles. On peut s'intéresser à comment se rendre d'un point à un autre de la manière la plus rapide possible. C'est un peu comme trouver le chemin le plus court pour aller d'une maison à l'école ou d'un endroit à un autre. Donc, en étudiant ce graphique sous cet angle, on se concentre sur la recherche du "plus court chemin" entre deux points spécifiques.</a:t>
+            </a:r>
+          </a:p>
+        </p:txBody>
+      </p:sp>
+    </p:spTree>
+    <p:extLst>
+      <p:ext uri="{BB962C8B-B14F-4D97-AF65-F5344CB8AC3E}">
+        <p14:creationId xmlns:p14="http://schemas.microsoft.com/office/powerpoint/2010/main" val="1722213058"/>
+      </p:ext>
+    </p:extLst>
+  </p:cSld>
+  <p:clrMapOvr>
+    <a:masterClrMapping/>
+  </p:clrMapOvr>
+</p:sld>
+</file>
+
+<file path=ppt/slides/slide6.xml><?xml version="1.0" encoding="utf-8"?>
 <p:sld xmlns:a="http://schemas.openxmlformats.org/drawingml/2006/main" xmlns:r="http://schemas.openxmlformats.org/officeDocument/2006/relationships" xmlns:p="http://schemas.openxmlformats.org/presentationml/2006/main">
   <p:cSld>
     <p:spTree>

</xml_diff>

<commit_message>
procedure rédigé et graph image créé
</commit_message>
<xml_diff>
--- a/Fiche_Projet_TE625PS.pptx
+++ b/Fiche_Projet_TE625PS.pptx
@@ -266,7 +266,7 @@
           <a:p>
             <a:fld id="{C3B7BECA-F21C-8F41-BA30-36B2786F78D6}" type="datetimeFigureOut">
               <a:rPr lang="fr-FR" smtClean="0"/>
-              <a:t>11/03/2024</a:t>
+              <a:t>18/03/2024</a:t>
             </a:fld>
             <a:endParaRPr lang="fr-FR"/>
           </a:p>
@@ -466,7 +466,7 @@
           <a:p>
             <a:fld id="{C3B7BECA-F21C-8F41-BA30-36B2786F78D6}" type="datetimeFigureOut">
               <a:rPr lang="fr-FR" smtClean="0"/>
-              <a:t>11/03/2024</a:t>
+              <a:t>18/03/2024</a:t>
             </a:fld>
             <a:endParaRPr lang="fr-FR"/>
           </a:p>
@@ -676,7 +676,7 @@
           <a:p>
             <a:fld id="{C3B7BECA-F21C-8F41-BA30-36B2786F78D6}" type="datetimeFigureOut">
               <a:rPr lang="fr-FR" smtClean="0"/>
-              <a:t>11/03/2024</a:t>
+              <a:t>18/03/2024</a:t>
             </a:fld>
             <a:endParaRPr lang="fr-FR"/>
           </a:p>
@@ -876,7 +876,7 @@
           <a:p>
             <a:fld id="{C3B7BECA-F21C-8F41-BA30-36B2786F78D6}" type="datetimeFigureOut">
               <a:rPr lang="fr-FR" smtClean="0"/>
-              <a:t>11/03/2024</a:t>
+              <a:t>18/03/2024</a:t>
             </a:fld>
             <a:endParaRPr lang="fr-FR"/>
           </a:p>
@@ -1152,7 +1152,7 @@
           <a:p>
             <a:fld id="{C3B7BECA-F21C-8F41-BA30-36B2786F78D6}" type="datetimeFigureOut">
               <a:rPr lang="fr-FR" smtClean="0"/>
-              <a:t>11/03/2024</a:t>
+              <a:t>18/03/2024</a:t>
             </a:fld>
             <a:endParaRPr lang="fr-FR"/>
           </a:p>
@@ -1420,7 +1420,7 @@
           <a:p>
             <a:fld id="{C3B7BECA-F21C-8F41-BA30-36B2786F78D6}" type="datetimeFigureOut">
               <a:rPr lang="fr-FR" smtClean="0"/>
-              <a:t>11/03/2024</a:t>
+              <a:t>18/03/2024</a:t>
             </a:fld>
             <a:endParaRPr lang="fr-FR"/>
           </a:p>
@@ -1835,7 +1835,7 @@
           <a:p>
             <a:fld id="{C3B7BECA-F21C-8F41-BA30-36B2786F78D6}" type="datetimeFigureOut">
               <a:rPr lang="fr-FR" smtClean="0"/>
-              <a:t>11/03/2024</a:t>
+              <a:t>18/03/2024</a:t>
             </a:fld>
             <a:endParaRPr lang="fr-FR"/>
           </a:p>
@@ -1977,7 +1977,7 @@
           <a:p>
             <a:fld id="{C3B7BECA-F21C-8F41-BA30-36B2786F78D6}" type="datetimeFigureOut">
               <a:rPr lang="fr-FR" smtClean="0"/>
-              <a:t>11/03/2024</a:t>
+              <a:t>18/03/2024</a:t>
             </a:fld>
             <a:endParaRPr lang="fr-FR"/>
           </a:p>
@@ -2090,7 +2090,7 @@
           <a:p>
             <a:fld id="{C3B7BECA-F21C-8F41-BA30-36B2786F78D6}" type="datetimeFigureOut">
               <a:rPr lang="fr-FR" smtClean="0"/>
-              <a:t>11/03/2024</a:t>
+              <a:t>18/03/2024</a:t>
             </a:fld>
             <a:endParaRPr lang="fr-FR"/>
           </a:p>
@@ -2403,7 +2403,7 @@
           <a:p>
             <a:fld id="{C3B7BECA-F21C-8F41-BA30-36B2786F78D6}" type="datetimeFigureOut">
               <a:rPr lang="fr-FR" smtClean="0"/>
-              <a:t>11/03/2024</a:t>
+              <a:t>18/03/2024</a:t>
             </a:fld>
             <a:endParaRPr lang="fr-FR"/>
           </a:p>
@@ -2692,7 +2692,7 @@
           <a:p>
             <a:fld id="{C3B7BECA-F21C-8F41-BA30-36B2786F78D6}" type="datetimeFigureOut">
               <a:rPr lang="fr-FR" smtClean="0"/>
-              <a:t>11/03/2024</a:t>
+              <a:t>18/03/2024</a:t>
             </a:fld>
             <a:endParaRPr lang="fr-FR"/>
           </a:p>
@@ -2935,7 +2935,7 @@
           <a:p>
             <a:fld id="{C3B7BECA-F21C-8F41-BA30-36B2786F78D6}" type="datetimeFigureOut">
               <a:rPr lang="fr-FR" smtClean="0"/>
-              <a:t>11/03/2024</a:t>
+              <a:t>18/03/2024</a:t>
             </a:fld>
             <a:endParaRPr lang="fr-FR"/>
           </a:p>
@@ -4007,13 +4007,72 @@
         </p:nvSpPr>
         <p:spPr/>
         <p:txBody>
-          <a:bodyPr/>
-          <a:lstStyle/>
-          <a:p>
-            <a:r>
-              <a:rPr lang="fr-FR" dirty="0"/>
-              <a:t>Bien sûr ! Alors, imagine que sur une feuille de papier avec des points et des lignes, on peut regarder les choses sous différents angles. On peut s'intéresser à comment se rendre d'un point à un autre de la manière la plus rapide possible. C'est un peu comme trouver le chemin le plus court pour aller d'une maison à l'école ou d'un endroit à un autre. Donc, en étudiant ce graphique sous cet angle, on se concentre sur la recherche du "plus court chemin" entre deux points spécifiques.</a:t>
-            </a:r>
+          <a:bodyPr>
+            <a:normAutofit fontScale="70000" lnSpcReduction="20000"/>
+          </a:bodyPr>
+          <a:lstStyle/>
+          <a:p>
+            <a:r>
+              <a:rPr lang="fr-FR" dirty="0"/>
+              <a:t>Phase d’apprentissage :</a:t>
+            </a:r>
+          </a:p>
+          <a:p>
+            <a:pPr lvl="1"/>
+            <a:r>
+              <a:rPr lang="fr-FR" dirty="0"/>
+              <a:t>Lorsque l'individu est placé devant un écran, il sera d'abord accueilli par une petite introduction sur ce qu'est un graphe. Ensuite, lorsqu'il décidera de commencer la phase d'apprentissage, il pourra appuyer sur un bouton pour démarrer. La phase d'apprentissage sera différente entre le groupe A et le groupe B.</a:t>
+            </a:r>
+          </a:p>
+          <a:p>
+            <a:pPr lvl="1"/>
+            <a:r>
+              <a:rPr lang="fr-FR" dirty="0"/>
+              <a:t>Pour le groupe A, un graphe sera affiché sur la partie gauche de l'écran, accompagné d'un tableau sur la droite permettant de résoudre le problème du plus court chemin. Dans la première étape, une consigne l'invitera à observer seulement le remplissage de la première ligne du tableau. Dans la deuxième étape, la ligne suivante s'affichera avec une case manquante, et la consigne lui expliquera comment la remplir. Au fur et à mesure que les étapes avancent, il devra remplir plus de cases pour chaque ligne. Si l'individu n'atteint pas un taux de réussite de 100%, il devra refaire la phase d'apprentissage.</a:t>
+            </a:r>
+          </a:p>
+          <a:p>
+            <a:pPr lvl="1"/>
+            <a:r>
+              <a:rPr lang="fr-FR" dirty="0"/>
+              <a:t>Pour le groupe B, l'algorithme de Dijkstra sera affiché en pseudo-code sur la partie gauche de l'écran, accompagné d'un script Python avec des trous à remplir sur la droite. Tout comme pour le groupe A, si les individus du groupe B n'atteignent pas un taux de réussite de 100%, ils devront également refaire la phase d'apprentissage.</a:t>
+            </a:r>
+          </a:p>
+          <a:p>
+            <a:pPr marL="0" indent="0">
+              <a:buNone/>
+            </a:pPr>
+            <a:endParaRPr lang="fr-FR" dirty="0"/>
+          </a:p>
+          <a:p>
+            <a:r>
+              <a:rPr lang="fr-FR" dirty="0"/>
+              <a:t>Phase d’</a:t>
+            </a:r>
+            <a:r>
+              <a:rPr lang="fr-FR" dirty="0" err="1"/>
+              <a:t>experimentation</a:t>
+            </a:r>
+            <a:r>
+              <a:rPr lang="fr-FR" dirty="0"/>
+              <a:t>:</a:t>
+            </a:r>
+          </a:p>
+          <a:p>
+            <a:pPr lvl="1"/>
+            <a:r>
+              <a:rPr lang="fr-FR" dirty="0"/>
+              <a:t>Dans la phase expérimentale, tous les individus se verront présenter un graphe différent de celui qui a été présenté au groupe A pendant la phase d'apprentissage. Leur tâche consistera à trouver le plus court chemin à l'aide d'un brouillon papier. </a:t>
+            </a:r>
+            <a:r>
+              <a:rPr lang="fr-FR"/>
+              <a:t>Ils devront inscrire leur réponse sous forme de mots formant le chemin, avec la longueur du chemin entre parenthèses.</a:t>
+            </a:r>
+            <a:endParaRPr lang="fr-FR" dirty="0"/>
+          </a:p>
+          <a:p>
+            <a:pPr lvl="1"/>
+            <a:endParaRPr lang="fr-FR" dirty="0"/>
           </a:p>
         </p:txBody>
       </p:sp>

</xml_diff>